<commit_message>
create deap algorithm test
</commit_message>
<xml_diff>
--- a/slides/UpdateSlides.pptx
+++ b/slides/UpdateSlides.pptx
@@ -261,7 +261,7 @@
           <a:p>
             <a:fld id="{3110257A-BAA8-4D64-B049-2BAED0F09ABC}" type="datetimeFigureOut">
               <a:rPr lang="en-GB" smtClean="0"/>
-              <a:t>07/01/2019</a:t>
+              <a:t>08/01/2019</a:t>
             </a:fld>
             <a:endParaRPr lang="en-GB"/>
           </a:p>
@@ -431,7 +431,7 @@
           <a:p>
             <a:fld id="{3110257A-BAA8-4D64-B049-2BAED0F09ABC}" type="datetimeFigureOut">
               <a:rPr lang="en-GB" smtClean="0"/>
-              <a:t>07/01/2019</a:t>
+              <a:t>08/01/2019</a:t>
             </a:fld>
             <a:endParaRPr lang="en-GB"/>
           </a:p>
@@ -611,7 +611,7 @@
           <a:p>
             <a:fld id="{3110257A-BAA8-4D64-B049-2BAED0F09ABC}" type="datetimeFigureOut">
               <a:rPr lang="en-GB" smtClean="0"/>
-              <a:t>07/01/2019</a:t>
+              <a:t>08/01/2019</a:t>
             </a:fld>
             <a:endParaRPr lang="en-GB"/>
           </a:p>
@@ -781,7 +781,7 @@
           <a:p>
             <a:fld id="{3110257A-BAA8-4D64-B049-2BAED0F09ABC}" type="datetimeFigureOut">
               <a:rPr lang="en-GB" smtClean="0"/>
-              <a:t>07/01/2019</a:t>
+              <a:t>08/01/2019</a:t>
             </a:fld>
             <a:endParaRPr lang="en-GB"/>
           </a:p>
@@ -1025,7 +1025,7 @@
           <a:p>
             <a:fld id="{3110257A-BAA8-4D64-B049-2BAED0F09ABC}" type="datetimeFigureOut">
               <a:rPr lang="en-GB" smtClean="0"/>
-              <a:t>07/01/2019</a:t>
+              <a:t>08/01/2019</a:t>
             </a:fld>
             <a:endParaRPr lang="en-GB"/>
           </a:p>
@@ -1257,7 +1257,7 @@
           <a:p>
             <a:fld id="{3110257A-BAA8-4D64-B049-2BAED0F09ABC}" type="datetimeFigureOut">
               <a:rPr lang="en-GB" smtClean="0"/>
-              <a:t>07/01/2019</a:t>
+              <a:t>08/01/2019</a:t>
             </a:fld>
             <a:endParaRPr lang="en-GB"/>
           </a:p>
@@ -1624,7 +1624,7 @@
           <a:p>
             <a:fld id="{3110257A-BAA8-4D64-B049-2BAED0F09ABC}" type="datetimeFigureOut">
               <a:rPr lang="en-GB" smtClean="0"/>
-              <a:t>07/01/2019</a:t>
+              <a:t>08/01/2019</a:t>
             </a:fld>
             <a:endParaRPr lang="en-GB"/>
           </a:p>
@@ -1742,7 +1742,7 @@
           <a:p>
             <a:fld id="{3110257A-BAA8-4D64-B049-2BAED0F09ABC}" type="datetimeFigureOut">
               <a:rPr lang="en-GB" smtClean="0"/>
-              <a:t>07/01/2019</a:t>
+              <a:t>08/01/2019</a:t>
             </a:fld>
             <a:endParaRPr lang="en-GB"/>
           </a:p>
@@ -1837,7 +1837,7 @@
           <a:p>
             <a:fld id="{3110257A-BAA8-4D64-B049-2BAED0F09ABC}" type="datetimeFigureOut">
               <a:rPr lang="en-GB" smtClean="0"/>
-              <a:t>07/01/2019</a:t>
+              <a:t>08/01/2019</a:t>
             </a:fld>
             <a:endParaRPr lang="en-GB"/>
           </a:p>
@@ -2114,7 +2114,7 @@
           <a:p>
             <a:fld id="{3110257A-BAA8-4D64-B049-2BAED0F09ABC}" type="datetimeFigureOut">
               <a:rPr lang="en-GB" smtClean="0"/>
-              <a:t>07/01/2019</a:t>
+              <a:t>08/01/2019</a:t>
             </a:fld>
             <a:endParaRPr lang="en-GB"/>
           </a:p>
@@ -2371,7 +2371,7 @@
           <a:p>
             <a:fld id="{3110257A-BAA8-4D64-B049-2BAED0F09ABC}" type="datetimeFigureOut">
               <a:rPr lang="en-GB" smtClean="0"/>
-              <a:t>07/01/2019</a:t>
+              <a:t>08/01/2019</a:t>
             </a:fld>
             <a:endParaRPr lang="en-GB"/>
           </a:p>
@@ -2584,7 +2584,7 @@
           <a:p>
             <a:fld id="{3110257A-BAA8-4D64-B049-2BAED0F09ABC}" type="datetimeFigureOut">
               <a:rPr lang="en-GB" smtClean="0"/>
-              <a:t>07/01/2019</a:t>
+              <a:t>08/01/2019</a:t>
             </a:fld>
             <a:endParaRPr lang="en-GB"/>
           </a:p>

</xml_diff>